<commit_message>
updated manual test plan
</commit_message>
<xml_diff>
--- a/ManualTestPlan.pptx
+++ b/ManualTestPlan.pptx
@@ -7,12 +7,13 @@
   <p:sldIdLst>
     <p:sldId id="256" r:id="rId2"/>
     <p:sldId id="261" r:id="rId3"/>
-    <p:sldId id="260" r:id="rId4"/>
-    <p:sldId id="257" r:id="rId5"/>
-    <p:sldId id="258" r:id="rId6"/>
-    <p:sldId id="259" r:id="rId7"/>
-    <p:sldId id="262" r:id="rId8"/>
-    <p:sldId id="263" r:id="rId9"/>
+    <p:sldId id="264" r:id="rId4"/>
+    <p:sldId id="260" r:id="rId5"/>
+    <p:sldId id="257" r:id="rId6"/>
+    <p:sldId id="258" r:id="rId7"/>
+    <p:sldId id="259" r:id="rId8"/>
+    <p:sldId id="262" r:id="rId9"/>
+    <p:sldId id="263" r:id="rId10"/>
   </p:sldIdLst>
   <p:sldSz cx="12192000" cy="6858000"/>
   <p:notesSz cx="6858000" cy="9144000"/>
@@ -3227,8 +3228,8 @@
         </p:nvSpPr>
         <p:spPr>
           <a:xfrm>
-            <a:off x="867270" y="2738735"/>
-            <a:ext cx="4240696" cy="1200329"/>
+            <a:off x="6960704" y="3105834"/>
+            <a:ext cx="4240696" cy="646331"/>
           </a:xfrm>
           <a:prstGeom prst="rect">
             <a:avLst/>
@@ -3248,22 +3249,7 @@
                 <a:latin typeface="Times New Roman"/>
                 <a:cs typeface="Times New Roman"/>
               </a:rPr>
-              <a:t>Choosing “Login with GitHub” will send them to </a:t>
-            </a:r>
-            <a:r>
-              <a:rPr lang="en-US" dirty="0">
-                <a:latin typeface="Times New Roman"/>
-                <a:cs typeface="Times New Roman"/>
-                <a:hlinkClick r:id="rId2"/>
-              </a:rPr>
-              <a:t>https://www.github.com</a:t>
-            </a:r>
-            <a:r>
-              <a:rPr lang="en-US" dirty="0">
-                <a:latin typeface="Times New Roman"/>
-                <a:cs typeface="Times New Roman"/>
-              </a:rPr>
-              <a:t> for permissions to access non-sensitive data about the user.</a:t>
+              <a:t>Invalid username and/or password entry will result in this alert.</a:t>
             </a:r>
             <a:endParaRPr lang="en-US" dirty="0">
               <a:cs typeface="Calibri"/>
@@ -3273,10 +3259,10 @@
       </p:sp>
       <p:pic>
         <p:nvPicPr>
-          <p:cNvPr id="4" name="Picture 3" descr="A screenshot of a cell phone&#13;&#10;&#13;&#10;Description automatically generated">
+          <p:cNvPr id="3" name="Picture 2">
             <a:extLst>
               <a:ext uri="{FF2B5EF4-FFF2-40B4-BE49-F238E27FC236}">
-                <a16:creationId xmlns:a16="http://schemas.microsoft.com/office/drawing/2014/main" id="{3F2F0C34-B22E-7F47-9E11-E0B3BADE5664}"/>
+                <a16:creationId xmlns:a16="http://schemas.microsoft.com/office/drawing/2014/main" id="{FD3928DF-E84F-8647-9B78-B1C53F30E69E}"/>
               </a:ext>
             </a:extLst>
           </p:cNvPr>
@@ -3286,7 +3272,7 @@
           <p:nvPr/>
         </p:nvPicPr>
         <p:blipFill>
-          <a:blip r:embed="rId3">
+          <a:blip r:embed="rId2">
             <a:extLst>
               <a:ext uri="{28A0092B-C50C-407E-A947-70E740481C1C}">
                 <a14:useLocalDpi xmlns:a14="http://schemas.microsoft.com/office/drawing/2010/main" val="0"/>
@@ -3299,7 +3285,7 @@
         </p:blipFill>
         <p:spPr>
           <a:xfrm>
-            <a:off x="6221148" y="0"/>
+            <a:off x="2927237" y="0"/>
             <a:ext cx="3168763" cy="6858000"/>
           </a:xfrm>
           <a:prstGeom prst="rect">
@@ -3351,6 +3337,130 @@
         </p:nvSpPr>
         <p:spPr>
           <a:xfrm>
+            <a:off x="867270" y="2738735"/>
+            <a:ext cx="4240696" cy="1200329"/>
+          </a:xfrm>
+          <a:prstGeom prst="rect">
+            <a:avLst/>
+          </a:prstGeom>
+        </p:spPr>
+        <p:txBody>
+          <a:bodyPr rot="0" spcFirstLastPara="0" vertOverflow="overflow" horzOverflow="overflow" vert="horz" wrap="square" lIns="91440" tIns="45720" rIns="91440" bIns="45720" numCol="1" spcCol="0" rtlCol="0" fromWordArt="0" anchor="t" anchorCtr="0" forceAA="0" compatLnSpc="1">
+            <a:prstTxWarp prst="textNoShape">
+              <a:avLst/>
+            </a:prstTxWarp>
+            <a:spAutoFit/>
+          </a:bodyPr>
+          <a:lstStyle/>
+          <a:p>
+            <a:r>
+              <a:rPr lang="en-US" dirty="0">
+                <a:latin typeface="Times New Roman"/>
+                <a:cs typeface="Times New Roman"/>
+              </a:rPr>
+              <a:t>Choosing “Login with GitHub” will send them to </a:t>
+            </a:r>
+            <a:r>
+              <a:rPr lang="en-US" dirty="0">
+                <a:latin typeface="Times New Roman"/>
+                <a:cs typeface="Times New Roman"/>
+                <a:hlinkClick r:id="rId2"/>
+              </a:rPr>
+              <a:t>https://www.github.com</a:t>
+            </a:r>
+            <a:r>
+              <a:rPr lang="en-US" dirty="0">
+                <a:latin typeface="Times New Roman"/>
+                <a:cs typeface="Times New Roman"/>
+              </a:rPr>
+              <a:t> for permissions to access non-sensitive data about the user.</a:t>
+            </a:r>
+            <a:endParaRPr lang="en-US" dirty="0">
+              <a:cs typeface="Calibri"/>
+            </a:endParaRPr>
+          </a:p>
+        </p:txBody>
+      </p:sp>
+      <p:pic>
+        <p:nvPicPr>
+          <p:cNvPr id="4" name="Picture 3" descr="A screenshot of a cell phone&#13;&#10;&#13;&#10;Description automatically generated">
+            <a:extLst>
+              <a:ext uri="{FF2B5EF4-FFF2-40B4-BE49-F238E27FC236}">
+                <a16:creationId xmlns:a16="http://schemas.microsoft.com/office/drawing/2014/main" id="{3F2F0C34-B22E-7F47-9E11-E0B3BADE5664}"/>
+              </a:ext>
+            </a:extLst>
+          </p:cNvPr>
+          <p:cNvPicPr>
+            <a:picLocks noChangeAspect="1"/>
+          </p:cNvPicPr>
+          <p:nvPr/>
+        </p:nvPicPr>
+        <p:blipFill>
+          <a:blip r:embed="rId3">
+            <a:extLst>
+              <a:ext uri="{28A0092B-C50C-407E-A947-70E740481C1C}">
+                <a14:useLocalDpi xmlns:a14="http://schemas.microsoft.com/office/drawing/2010/main" val="0"/>
+              </a:ext>
+            </a:extLst>
+          </a:blip>
+          <a:stretch>
+            <a:fillRect/>
+          </a:stretch>
+        </p:blipFill>
+        <p:spPr>
+          <a:xfrm>
+            <a:off x="6221148" y="0"/>
+            <a:ext cx="3168763" cy="6858000"/>
+          </a:xfrm>
+          <a:prstGeom prst="rect">
+            <a:avLst/>
+          </a:prstGeom>
+        </p:spPr>
+      </p:pic>
+    </p:spTree>
+    <p:extLst>
+      <p:ext uri="{BB962C8B-B14F-4D97-AF65-F5344CB8AC3E}">
+        <p14:creationId xmlns:p14="http://schemas.microsoft.com/office/powerpoint/2010/main" val="1054355434"/>
+      </p:ext>
+    </p:extLst>
+  </p:cSld>
+  <p:clrMapOvr>
+    <a:masterClrMapping/>
+  </p:clrMapOvr>
+</p:sld>
+</file>
+
+<file path=ppt/slides/slide4.xml><?xml version="1.0" encoding="utf-8"?>
+<p:sld xmlns:a="http://schemas.openxmlformats.org/drawingml/2006/main" xmlns:r="http://schemas.openxmlformats.org/officeDocument/2006/relationships" xmlns:p="http://schemas.openxmlformats.org/presentationml/2006/main">
+  <p:cSld>
+    <p:spTree>
+      <p:nvGrpSpPr>
+        <p:cNvPr id="1" name=""/>
+        <p:cNvGrpSpPr/>
+        <p:nvPr/>
+      </p:nvGrpSpPr>
+      <p:grpSpPr>
+        <a:xfrm>
+          <a:off x="0" y="0"/>
+          <a:ext cx="0" cy="0"/>
+          <a:chOff x="0" y="0"/>
+          <a:chExt cx="0" cy="0"/>
+        </a:xfrm>
+      </p:grpSpPr>
+      <p:sp>
+        <p:nvSpPr>
+          <p:cNvPr id="8" name="TextBox 7">
+            <a:extLst>
+              <a:ext uri="{FF2B5EF4-FFF2-40B4-BE49-F238E27FC236}">
+                <a16:creationId xmlns:a16="http://schemas.microsoft.com/office/drawing/2014/main" id="{008E6972-706A-4845-B95A-7664E3CD13A9}"/>
+              </a:ext>
+            </a:extLst>
+          </p:cNvPr>
+          <p:cNvSpPr txBox="1"/>
+          <p:nvPr/>
+        </p:nvSpPr>
+        <p:spPr>
+          <a:xfrm>
             <a:off x="5529471" y="2935357"/>
             <a:ext cx="5115339" cy="1200329"/>
           </a:xfrm>
@@ -3443,7 +3553,7 @@
 </p:sld>
 </file>
 
-<file path=ppt/slides/slide4.xml><?xml version="1.0" encoding="utf-8"?>
+<file path=ppt/slides/slide5.xml><?xml version="1.0" encoding="utf-8"?>
 <p:sld xmlns:a="http://schemas.openxmlformats.org/drawingml/2006/main" xmlns:r="http://schemas.openxmlformats.org/officeDocument/2006/relationships" xmlns:p="http://schemas.openxmlformats.org/presentationml/2006/main">
   <p:cSld>
     <p:spTree>
@@ -3563,7 +3673,7 @@
 </p:sld>
 </file>
 
-<file path=ppt/slides/slide5.xml><?xml version="1.0" encoding="utf-8"?>
+<file path=ppt/slides/slide6.xml><?xml version="1.0" encoding="utf-8"?>
 <p:sld xmlns:a="http://schemas.openxmlformats.org/drawingml/2006/main" xmlns:r="http://schemas.openxmlformats.org/officeDocument/2006/relationships" xmlns:p="http://schemas.openxmlformats.org/presentationml/2006/main">
   <p:cSld>
     <p:spTree>
@@ -3669,7 +3779,7 @@
 </p:sld>
 </file>
 
-<file path=ppt/slides/slide6.xml><?xml version="1.0" encoding="utf-8"?>
+<file path=ppt/slides/slide7.xml><?xml version="1.0" encoding="utf-8"?>
 <p:sld xmlns:a="http://schemas.openxmlformats.org/drawingml/2006/main" xmlns:r="http://schemas.openxmlformats.org/officeDocument/2006/relationships" xmlns:p="http://schemas.openxmlformats.org/presentationml/2006/main">
   <p:cSld>
     <p:spTree>
@@ -3852,7 +3962,7 @@
 </p:sld>
 </file>
 
-<file path=ppt/slides/slide7.xml><?xml version="1.0" encoding="utf-8"?>
+<file path=ppt/slides/slide8.xml><?xml version="1.0" encoding="utf-8"?>
 <p:sld xmlns:a="http://schemas.openxmlformats.org/drawingml/2006/main" xmlns:r="http://schemas.openxmlformats.org/officeDocument/2006/relationships" xmlns:p="http://schemas.openxmlformats.org/presentationml/2006/main">
   <p:cSld>
     <p:spTree>
@@ -3994,7 +4104,7 @@
 </p:sld>
 </file>
 
-<file path=ppt/slides/slide8.xml><?xml version="1.0" encoding="utf-8"?>
+<file path=ppt/slides/slide9.xml><?xml version="1.0" encoding="utf-8"?>
 <p:sld xmlns:a="http://schemas.openxmlformats.org/drawingml/2006/main" xmlns:r="http://schemas.openxmlformats.org/officeDocument/2006/relationships" xmlns:p="http://schemas.openxmlformats.org/presentationml/2006/main">
   <p:cSld>
     <p:spTree>

</xml_diff>